<commit_message>
edit pptx proposal document
</commit_message>
<xml_diff>
--- a/documents/Thrift_store.pptx
+++ b/documents/Thrift_store.pptx
@@ -12,7 +12,8 @@
     <p:sldId id="260" r:id="rId6"/>
     <p:sldId id="261" r:id="rId7"/>
     <p:sldId id="262" r:id="rId8"/>
-    <p:sldId id="263" r:id="rId9"/>
+    <p:sldId id="264" r:id="rId9"/>
+    <p:sldId id="263" r:id="rId10"/>
   </p:sldIdLst>
   <p:sldSz cx="12192000" cy="6858000"/>
   <p:notesSz cx="6858000" cy="9144000"/>
@@ -1470,6 +1471,859 @@
       <dsp:cNvGrpSpPr/>
     </dsp:nvGrpSpPr>
     <dsp:grpSpPr/>
+    <dsp:sp modelId="{F0381753-2071-4874-9DDE-D18AEF99D36C}">
+      <dsp:nvSpPr>
+        <dsp:cNvPr id="0" name=""/>
+        <dsp:cNvSpPr/>
+      </dsp:nvSpPr>
+      <dsp:spPr>
+        <a:xfrm rot="5400000">
+          <a:off x="1871614" y="585593"/>
+          <a:ext cx="504065" cy="573860"/>
+        </a:xfrm>
+        <a:prstGeom prst="bentUpArrow">
+          <a:avLst>
+            <a:gd name="adj1" fmla="val 32840"/>
+            <a:gd name="adj2" fmla="val 25000"/>
+            <a:gd name="adj3" fmla="val 35780"/>
+          </a:avLst>
+        </a:prstGeom>
+        <a:solidFill>
+          <a:schemeClr val="accent1">
+            <a:tint val="50000"/>
+            <a:hueOff val="0"/>
+            <a:satOff val="0"/>
+            <a:lumOff val="0"/>
+            <a:alphaOff val="0"/>
+          </a:schemeClr>
+        </a:solidFill>
+        <a:ln w="15875" cap="rnd" cmpd="sng" algn="ctr">
+          <a:solidFill>
+            <a:schemeClr val="lt1">
+              <a:hueOff val="0"/>
+              <a:satOff val="0"/>
+              <a:lumOff val="0"/>
+              <a:alphaOff val="0"/>
+            </a:schemeClr>
+          </a:solidFill>
+          <a:prstDash val="solid"/>
+        </a:ln>
+        <a:effectLst/>
+      </dsp:spPr>
+      <dsp:style>
+        <a:lnRef idx="2">
+          <a:scrgbClr r="0" g="0" b="0"/>
+        </a:lnRef>
+        <a:fillRef idx="1">
+          <a:scrgbClr r="0" g="0" b="0"/>
+        </a:fillRef>
+        <a:effectRef idx="0">
+          <a:scrgbClr r="0" g="0" b="0"/>
+        </a:effectRef>
+        <a:fontRef idx="minor"/>
+      </dsp:style>
+    </dsp:sp>
+    <dsp:sp modelId="{3FD1266C-33C7-49E2-910B-D27EF2BF54BD}">
+      <dsp:nvSpPr>
+        <dsp:cNvPr id="0" name=""/>
+        <dsp:cNvSpPr/>
+      </dsp:nvSpPr>
+      <dsp:spPr>
+        <a:xfrm>
+          <a:off x="1487185" y="26827"/>
+          <a:ext cx="1350312" cy="593956"/>
+        </a:xfrm>
+        <a:prstGeom prst="roundRect">
+          <a:avLst>
+            <a:gd name="adj" fmla="val 16670"/>
+          </a:avLst>
+        </a:prstGeom>
+        <a:solidFill>
+          <a:schemeClr val="bg1"/>
+        </a:solidFill>
+        <a:ln w="15875" cap="rnd" cmpd="sng" algn="ctr">
+          <a:solidFill>
+            <a:schemeClr val="tx1"/>
+          </a:solidFill>
+          <a:prstDash val="solid"/>
+        </a:ln>
+        <a:effectLst/>
+      </dsp:spPr>
+      <dsp:style>
+        <a:lnRef idx="2">
+          <a:scrgbClr r="0" g="0" b="0"/>
+        </a:lnRef>
+        <a:fillRef idx="1">
+          <a:scrgbClr r="0" g="0" b="0"/>
+        </a:fillRef>
+        <a:effectRef idx="0">
+          <a:scrgbClr r="0" g="0" b="0"/>
+        </a:effectRef>
+        <a:fontRef idx="minor">
+          <a:schemeClr val="lt1"/>
+        </a:fontRef>
+      </dsp:style>
+      <dsp:txBody>
+        <a:bodyPr spcFirstLastPara="0" vert="horz" wrap="square" lIns="34290" tIns="34290" rIns="34290" bIns="34290" numCol="1" spcCol="1270" anchor="ctr" anchorCtr="0">
+          <a:noAutofit/>
+        </a:bodyPr>
+        <a:lstStyle/>
+        <a:p>
+          <a:pPr lvl="0" algn="ctr" defTabSz="400050">
+            <a:lnSpc>
+              <a:spcPct val="90000"/>
+            </a:lnSpc>
+            <a:spcBef>
+              <a:spcPct val="0"/>
+            </a:spcBef>
+            <a:spcAft>
+              <a:spcPct val="35000"/>
+            </a:spcAft>
+          </a:pPr>
+          <a:r>
+            <a:rPr lang="en-US" sz="900" kern="1200">
+              <a:solidFill>
+                <a:schemeClr val="tx1"/>
+              </a:solidFill>
+            </a:rPr>
+            <a:t>Requirements</a:t>
+          </a:r>
+        </a:p>
+      </dsp:txBody>
+      <dsp:txXfrm>
+        <a:off x="1516185" y="55827"/>
+        <a:ext cx="1292312" cy="535956"/>
+      </dsp:txXfrm>
+    </dsp:sp>
+    <dsp:sp modelId="{9DFC67D6-B936-4C68-832A-B9F63802197D}">
+      <dsp:nvSpPr>
+        <dsp:cNvPr id="0" name=""/>
+        <dsp:cNvSpPr/>
+      </dsp:nvSpPr>
+      <dsp:spPr>
+        <a:xfrm>
+          <a:off x="2413507" y="83474"/>
+          <a:ext cx="963370" cy="480062"/>
+        </a:xfrm>
+        <a:prstGeom prst="rect">
+          <a:avLst/>
+        </a:prstGeom>
+        <a:noFill/>
+        <a:ln>
+          <a:noFill/>
+        </a:ln>
+        <a:effectLst/>
+      </dsp:spPr>
+      <dsp:style>
+        <a:lnRef idx="0">
+          <a:scrgbClr r="0" g="0" b="0"/>
+        </a:lnRef>
+        <a:fillRef idx="0">
+          <a:scrgbClr r="0" g="0" b="0"/>
+        </a:fillRef>
+        <a:effectRef idx="0">
+          <a:scrgbClr r="0" g="0" b="0"/>
+        </a:effectRef>
+        <a:fontRef idx="minor"/>
+      </dsp:style>
+    </dsp:sp>
+    <dsp:sp modelId="{08BB0C15-5853-463D-ACE9-30241D61ACF4}">
+      <dsp:nvSpPr>
+        <dsp:cNvPr id="0" name=""/>
+        <dsp:cNvSpPr/>
+      </dsp:nvSpPr>
+      <dsp:spPr>
+        <a:xfrm rot="5400000">
+          <a:off x="2822345" y="1252803"/>
+          <a:ext cx="504065" cy="573860"/>
+        </a:xfrm>
+        <a:prstGeom prst="bentUpArrow">
+          <a:avLst>
+            <a:gd name="adj1" fmla="val 32840"/>
+            <a:gd name="adj2" fmla="val 25000"/>
+            <a:gd name="adj3" fmla="val 35780"/>
+          </a:avLst>
+        </a:prstGeom>
+        <a:solidFill>
+          <a:schemeClr val="accent1">
+            <a:tint val="50000"/>
+            <a:hueOff val="0"/>
+            <a:satOff val="0"/>
+            <a:lumOff val="0"/>
+            <a:alphaOff val="0"/>
+          </a:schemeClr>
+        </a:solidFill>
+        <a:ln w="15875" cap="rnd" cmpd="sng" algn="ctr">
+          <a:solidFill>
+            <a:schemeClr val="lt1">
+              <a:hueOff val="0"/>
+              <a:satOff val="0"/>
+              <a:lumOff val="0"/>
+              <a:alphaOff val="0"/>
+            </a:schemeClr>
+          </a:solidFill>
+          <a:prstDash val="solid"/>
+        </a:ln>
+        <a:effectLst/>
+      </dsp:spPr>
+      <dsp:style>
+        <a:lnRef idx="2">
+          <a:scrgbClr r="0" g="0" b="0"/>
+        </a:lnRef>
+        <a:fillRef idx="1">
+          <a:scrgbClr r="0" g="0" b="0"/>
+        </a:fillRef>
+        <a:effectRef idx="0">
+          <a:scrgbClr r="0" g="0" b="0"/>
+        </a:effectRef>
+        <a:fontRef idx="minor"/>
+      </dsp:style>
+    </dsp:sp>
+    <dsp:sp modelId="{F6A4D1BD-26CE-4E33-ABE7-42EF5D647484}">
+      <dsp:nvSpPr>
+        <dsp:cNvPr id="0" name=""/>
+        <dsp:cNvSpPr/>
+      </dsp:nvSpPr>
+      <dsp:spPr>
+        <a:xfrm>
+          <a:off x="2394238" y="694037"/>
+          <a:ext cx="1437671" cy="593956"/>
+        </a:xfrm>
+        <a:prstGeom prst="roundRect">
+          <a:avLst>
+            <a:gd name="adj" fmla="val 16670"/>
+          </a:avLst>
+        </a:prstGeom>
+        <a:solidFill>
+          <a:schemeClr val="bg1"/>
+        </a:solidFill>
+        <a:ln w="15875" cap="rnd" cmpd="sng" algn="ctr">
+          <a:solidFill>
+            <a:schemeClr val="tx1"/>
+          </a:solidFill>
+          <a:prstDash val="solid"/>
+        </a:ln>
+        <a:effectLst/>
+      </dsp:spPr>
+      <dsp:style>
+        <a:lnRef idx="2">
+          <a:scrgbClr r="0" g="0" b="0"/>
+        </a:lnRef>
+        <a:fillRef idx="1">
+          <a:scrgbClr r="0" g="0" b="0"/>
+        </a:fillRef>
+        <a:effectRef idx="0">
+          <a:scrgbClr r="0" g="0" b="0"/>
+        </a:effectRef>
+        <a:fontRef idx="minor">
+          <a:schemeClr val="lt1"/>
+        </a:fontRef>
+      </dsp:style>
+      <dsp:txBody>
+        <a:bodyPr spcFirstLastPara="0" vert="horz" wrap="square" lIns="34290" tIns="34290" rIns="34290" bIns="34290" numCol="1" spcCol="1270" anchor="ctr" anchorCtr="0">
+          <a:noAutofit/>
+        </a:bodyPr>
+        <a:lstStyle/>
+        <a:p>
+          <a:pPr lvl="0" algn="ctr" defTabSz="400050">
+            <a:lnSpc>
+              <a:spcPct val="90000"/>
+            </a:lnSpc>
+            <a:spcBef>
+              <a:spcPct val="0"/>
+            </a:spcBef>
+            <a:spcAft>
+              <a:spcPct val="35000"/>
+            </a:spcAft>
+          </a:pPr>
+          <a:r>
+            <a:rPr lang="en-US" sz="900" kern="1200">
+              <a:solidFill>
+                <a:schemeClr val="tx1"/>
+              </a:solidFill>
+            </a:rPr>
+            <a:t>Specification</a:t>
+          </a:r>
+        </a:p>
+      </dsp:txBody>
+      <dsp:txXfrm>
+        <a:off x="2423238" y="723037"/>
+        <a:ext cx="1379671" cy="535956"/>
+      </dsp:txXfrm>
+    </dsp:sp>
+    <dsp:sp modelId="{C7FA8EF6-483D-45D8-A8E4-68C056F895D6}">
+      <dsp:nvSpPr>
+        <dsp:cNvPr id="0" name=""/>
+        <dsp:cNvSpPr/>
+      </dsp:nvSpPr>
+      <dsp:spPr>
+        <a:xfrm>
+          <a:off x="3537348" y="750684"/>
+          <a:ext cx="617153" cy="480062"/>
+        </a:xfrm>
+        <a:prstGeom prst="rect">
+          <a:avLst/>
+        </a:prstGeom>
+        <a:noFill/>
+        <a:ln>
+          <a:noFill/>
+        </a:ln>
+        <a:effectLst/>
+      </dsp:spPr>
+      <dsp:style>
+        <a:lnRef idx="0">
+          <a:scrgbClr r="0" g="0" b="0"/>
+        </a:lnRef>
+        <a:fillRef idx="0">
+          <a:scrgbClr r="0" g="0" b="0"/>
+        </a:fillRef>
+        <a:effectRef idx="0">
+          <a:scrgbClr r="0" g="0" b="0"/>
+        </a:effectRef>
+        <a:fontRef idx="minor"/>
+      </dsp:style>
+    </dsp:sp>
+    <dsp:sp modelId="{2761E471-A42B-43C4-867A-8F98182EA114}">
+      <dsp:nvSpPr>
+        <dsp:cNvPr id="0" name=""/>
+        <dsp:cNvSpPr/>
+      </dsp:nvSpPr>
+      <dsp:spPr>
+        <a:xfrm rot="5400000">
+          <a:off x="3707569" y="1920012"/>
+          <a:ext cx="504065" cy="573860"/>
+        </a:xfrm>
+        <a:prstGeom prst="bentUpArrow">
+          <a:avLst>
+            <a:gd name="adj1" fmla="val 32840"/>
+            <a:gd name="adj2" fmla="val 25000"/>
+            <a:gd name="adj3" fmla="val 35780"/>
+          </a:avLst>
+        </a:prstGeom>
+        <a:solidFill>
+          <a:schemeClr val="accent1">
+            <a:tint val="50000"/>
+            <a:hueOff val="0"/>
+            <a:satOff val="0"/>
+            <a:lumOff val="0"/>
+            <a:alphaOff val="0"/>
+          </a:schemeClr>
+        </a:solidFill>
+        <a:ln w="15875" cap="rnd" cmpd="sng" algn="ctr">
+          <a:solidFill>
+            <a:schemeClr val="lt1">
+              <a:hueOff val="0"/>
+              <a:satOff val="0"/>
+              <a:lumOff val="0"/>
+              <a:alphaOff val="0"/>
+            </a:schemeClr>
+          </a:solidFill>
+          <a:prstDash val="solid"/>
+        </a:ln>
+        <a:effectLst/>
+      </dsp:spPr>
+      <dsp:style>
+        <a:lnRef idx="2">
+          <a:scrgbClr r="0" g="0" b="0"/>
+        </a:lnRef>
+        <a:fillRef idx="1">
+          <a:scrgbClr r="0" g="0" b="0"/>
+        </a:fillRef>
+        <a:effectRef idx="0">
+          <a:scrgbClr r="0" g="0" b="0"/>
+        </a:effectRef>
+        <a:fontRef idx="minor"/>
+      </dsp:style>
+    </dsp:sp>
+    <dsp:sp modelId="{531C0244-26E8-4DB4-97EF-55DEA8FED347}">
+      <dsp:nvSpPr>
+        <dsp:cNvPr id="0" name=""/>
+        <dsp:cNvSpPr/>
+      </dsp:nvSpPr>
+      <dsp:spPr>
+        <a:xfrm>
+          <a:off x="3290811" y="1382207"/>
+          <a:ext cx="1394013" cy="593956"/>
+        </a:xfrm>
+        <a:prstGeom prst="roundRect">
+          <a:avLst>
+            <a:gd name="adj" fmla="val 16670"/>
+          </a:avLst>
+        </a:prstGeom>
+        <a:solidFill>
+          <a:schemeClr val="bg1"/>
+        </a:solidFill>
+        <a:ln w="15875" cap="rnd" cmpd="sng" algn="ctr">
+          <a:solidFill>
+            <a:schemeClr val="tx1"/>
+          </a:solidFill>
+          <a:prstDash val="solid"/>
+        </a:ln>
+        <a:effectLst/>
+      </dsp:spPr>
+      <dsp:style>
+        <a:lnRef idx="2">
+          <a:scrgbClr r="0" g="0" b="0"/>
+        </a:lnRef>
+        <a:fillRef idx="1">
+          <a:scrgbClr r="0" g="0" b="0"/>
+        </a:fillRef>
+        <a:effectRef idx="0">
+          <a:scrgbClr r="0" g="0" b="0"/>
+        </a:effectRef>
+        <a:fontRef idx="minor">
+          <a:schemeClr val="lt1"/>
+        </a:fontRef>
+      </dsp:style>
+      <dsp:txBody>
+        <a:bodyPr spcFirstLastPara="0" vert="horz" wrap="square" lIns="34290" tIns="34290" rIns="34290" bIns="34290" numCol="1" spcCol="1270" anchor="ctr" anchorCtr="0">
+          <a:noAutofit/>
+        </a:bodyPr>
+        <a:lstStyle/>
+        <a:p>
+          <a:pPr lvl="0" algn="ctr" defTabSz="400050">
+            <a:lnSpc>
+              <a:spcPct val="90000"/>
+            </a:lnSpc>
+            <a:spcBef>
+              <a:spcPct val="0"/>
+            </a:spcBef>
+            <a:spcAft>
+              <a:spcPct val="35000"/>
+            </a:spcAft>
+          </a:pPr>
+          <a:r>
+            <a:rPr lang="en-US" sz="900" kern="1200">
+              <a:solidFill>
+                <a:schemeClr val="tx1"/>
+              </a:solidFill>
+            </a:rPr>
+            <a:t>Design</a:t>
+          </a:r>
+        </a:p>
+      </dsp:txBody>
+      <dsp:txXfrm>
+        <a:off x="3319811" y="1411207"/>
+        <a:ext cx="1336013" cy="535956"/>
+      </dsp:txXfrm>
+    </dsp:sp>
+    <dsp:sp modelId="{FBA55925-C5B4-4F73-B270-369E0F2CB499}">
+      <dsp:nvSpPr>
+        <dsp:cNvPr id="0" name=""/>
+        <dsp:cNvSpPr/>
+      </dsp:nvSpPr>
+      <dsp:spPr>
+        <a:xfrm>
+          <a:off x="4422571" y="1417893"/>
+          <a:ext cx="617153" cy="480062"/>
+        </a:xfrm>
+        <a:prstGeom prst="rect">
+          <a:avLst/>
+        </a:prstGeom>
+        <a:noFill/>
+        <a:ln>
+          <a:noFill/>
+        </a:ln>
+        <a:effectLst/>
+      </dsp:spPr>
+      <dsp:style>
+        <a:lnRef idx="0">
+          <a:scrgbClr r="0" g="0" b="0"/>
+        </a:lnRef>
+        <a:fillRef idx="0">
+          <a:scrgbClr r="0" g="0" b="0"/>
+        </a:fillRef>
+        <a:effectRef idx="0">
+          <a:scrgbClr r="0" g="0" b="0"/>
+        </a:effectRef>
+        <a:fontRef idx="minor"/>
+      </dsp:style>
+    </dsp:sp>
+    <dsp:sp modelId="{6A80E51C-3AFF-44D0-B600-01E5C02C6F83}">
+      <dsp:nvSpPr>
+        <dsp:cNvPr id="0" name=""/>
+        <dsp:cNvSpPr/>
+      </dsp:nvSpPr>
+      <dsp:spPr>
+        <a:xfrm rot="5400000">
+          <a:off x="4622789" y="2587222"/>
+          <a:ext cx="504065" cy="573860"/>
+        </a:xfrm>
+        <a:prstGeom prst="bentUpArrow">
+          <a:avLst>
+            <a:gd name="adj1" fmla="val 32840"/>
+            <a:gd name="adj2" fmla="val 25000"/>
+            <a:gd name="adj3" fmla="val 35780"/>
+          </a:avLst>
+        </a:prstGeom>
+        <a:solidFill>
+          <a:schemeClr val="accent1">
+            <a:tint val="50000"/>
+            <a:hueOff val="0"/>
+            <a:satOff val="0"/>
+            <a:lumOff val="0"/>
+            <a:alphaOff val="0"/>
+          </a:schemeClr>
+        </a:solidFill>
+        <a:ln w="15875" cap="rnd" cmpd="sng" algn="ctr">
+          <a:solidFill>
+            <a:schemeClr val="lt1">
+              <a:hueOff val="0"/>
+              <a:satOff val="0"/>
+              <a:lumOff val="0"/>
+              <a:alphaOff val="0"/>
+            </a:schemeClr>
+          </a:solidFill>
+          <a:prstDash val="solid"/>
+        </a:ln>
+        <a:effectLst/>
+      </dsp:spPr>
+      <dsp:style>
+        <a:lnRef idx="2">
+          <a:scrgbClr r="0" g="0" b="0"/>
+        </a:lnRef>
+        <a:fillRef idx="1">
+          <a:scrgbClr r="0" g="0" b="0"/>
+        </a:fillRef>
+        <a:effectRef idx="0">
+          <a:scrgbClr r="0" g="0" b="0"/>
+        </a:effectRef>
+        <a:fontRef idx="minor"/>
+      </dsp:style>
+    </dsp:sp>
+    <dsp:sp modelId="{665838E7-C88D-4128-B951-D56469C0B0FA}">
+      <dsp:nvSpPr>
+        <dsp:cNvPr id="0" name=""/>
+        <dsp:cNvSpPr/>
+      </dsp:nvSpPr>
+      <dsp:spPr>
+        <a:xfrm>
+          <a:off x="4208343" y="2028455"/>
+          <a:ext cx="1410347" cy="593956"/>
+        </a:xfrm>
+        <a:prstGeom prst="roundRect">
+          <a:avLst>
+            <a:gd name="adj" fmla="val 16670"/>
+          </a:avLst>
+        </a:prstGeom>
+        <a:solidFill>
+          <a:schemeClr val="bg1"/>
+        </a:solidFill>
+        <a:ln w="15875" cap="rnd" cmpd="sng" algn="ctr">
+          <a:solidFill>
+            <a:schemeClr val="tx1"/>
+          </a:solidFill>
+          <a:prstDash val="solid"/>
+        </a:ln>
+        <a:effectLst/>
+      </dsp:spPr>
+      <dsp:style>
+        <a:lnRef idx="2">
+          <a:scrgbClr r="0" g="0" b="0"/>
+        </a:lnRef>
+        <a:fillRef idx="1">
+          <a:scrgbClr r="0" g="0" b="0"/>
+        </a:fillRef>
+        <a:effectRef idx="0">
+          <a:scrgbClr r="0" g="0" b="0"/>
+        </a:effectRef>
+        <a:fontRef idx="minor">
+          <a:schemeClr val="lt1"/>
+        </a:fontRef>
+      </dsp:style>
+      <dsp:txBody>
+        <a:bodyPr spcFirstLastPara="0" vert="horz" wrap="square" lIns="34290" tIns="34290" rIns="34290" bIns="34290" numCol="1" spcCol="1270" anchor="ctr" anchorCtr="0">
+          <a:noAutofit/>
+        </a:bodyPr>
+        <a:lstStyle/>
+        <a:p>
+          <a:pPr lvl="0" algn="ctr" defTabSz="400050">
+            <a:lnSpc>
+              <a:spcPct val="90000"/>
+            </a:lnSpc>
+            <a:spcBef>
+              <a:spcPct val="0"/>
+            </a:spcBef>
+            <a:spcAft>
+              <a:spcPct val="35000"/>
+            </a:spcAft>
+          </a:pPr>
+          <a:r>
+            <a:rPr lang="en-US" sz="900" kern="1200">
+              <a:solidFill>
+                <a:schemeClr val="tx1"/>
+              </a:solidFill>
+            </a:rPr>
+            <a:t>Implementation</a:t>
+          </a:r>
+          <a:endParaRPr lang="en-US" sz="900" kern="1200"/>
+        </a:p>
+      </dsp:txBody>
+      <dsp:txXfrm>
+        <a:off x="4237343" y="2057455"/>
+        <a:ext cx="1352347" cy="535956"/>
+      </dsp:txXfrm>
+    </dsp:sp>
+    <dsp:sp modelId="{3A488445-0B16-4F22-BB7A-B3BBCF421082}">
+      <dsp:nvSpPr>
+        <dsp:cNvPr id="0" name=""/>
+        <dsp:cNvSpPr/>
+      </dsp:nvSpPr>
+      <dsp:spPr>
+        <a:xfrm>
+          <a:off x="5337791" y="2085103"/>
+          <a:ext cx="617153" cy="480062"/>
+        </a:xfrm>
+        <a:prstGeom prst="rect">
+          <a:avLst/>
+        </a:prstGeom>
+        <a:noFill/>
+        <a:ln>
+          <a:noFill/>
+        </a:ln>
+        <a:effectLst/>
+      </dsp:spPr>
+      <dsp:style>
+        <a:lnRef idx="0">
+          <a:scrgbClr r="0" g="0" b="0"/>
+        </a:lnRef>
+        <a:fillRef idx="0">
+          <a:scrgbClr r="0" g="0" b="0"/>
+        </a:fillRef>
+        <a:effectRef idx="0">
+          <a:scrgbClr r="0" g="0" b="0"/>
+        </a:effectRef>
+        <a:fontRef idx="minor"/>
+      </dsp:style>
+    </dsp:sp>
+    <dsp:sp modelId="{6CEA2E2A-2DE1-4D4A-A3EB-6E755AA7A8F0}">
+      <dsp:nvSpPr>
+        <dsp:cNvPr id="0" name=""/>
+        <dsp:cNvSpPr/>
+      </dsp:nvSpPr>
+      <dsp:spPr>
+        <a:xfrm rot="5400000">
+          <a:off x="5502035" y="3254431"/>
+          <a:ext cx="504065" cy="573860"/>
+        </a:xfrm>
+        <a:prstGeom prst="bentUpArrow">
+          <a:avLst>
+            <a:gd name="adj1" fmla="val 32840"/>
+            <a:gd name="adj2" fmla="val 25000"/>
+            <a:gd name="adj3" fmla="val 35780"/>
+          </a:avLst>
+        </a:prstGeom>
+        <a:solidFill>
+          <a:schemeClr val="accent1">
+            <a:tint val="50000"/>
+            <a:hueOff val="0"/>
+            <a:satOff val="0"/>
+            <a:lumOff val="0"/>
+            <a:alphaOff val="0"/>
+          </a:schemeClr>
+        </a:solidFill>
+        <a:ln w="15875" cap="rnd" cmpd="sng" algn="ctr">
+          <a:solidFill>
+            <a:schemeClr val="lt1">
+              <a:hueOff val="0"/>
+              <a:satOff val="0"/>
+              <a:lumOff val="0"/>
+              <a:alphaOff val="0"/>
+            </a:schemeClr>
+          </a:solidFill>
+          <a:prstDash val="solid"/>
+        </a:ln>
+        <a:effectLst/>
+      </dsp:spPr>
+      <dsp:style>
+        <a:lnRef idx="2">
+          <a:scrgbClr r="0" g="0" b="0"/>
+        </a:lnRef>
+        <a:fillRef idx="1">
+          <a:scrgbClr r="0" g="0" b="0"/>
+        </a:fillRef>
+        <a:effectRef idx="0">
+          <a:scrgbClr r="0" g="0" b="0"/>
+        </a:effectRef>
+        <a:fontRef idx="minor"/>
+      </dsp:style>
+    </dsp:sp>
+    <dsp:sp modelId="{11EB531B-CCE2-4C49-AF1F-8A93094B1C15}">
+      <dsp:nvSpPr>
+        <dsp:cNvPr id="0" name=""/>
+        <dsp:cNvSpPr/>
+      </dsp:nvSpPr>
+      <dsp:spPr>
+        <a:xfrm>
+          <a:off x="5115396" y="2695665"/>
+          <a:ext cx="1354733" cy="593956"/>
+        </a:xfrm>
+        <a:prstGeom prst="roundRect">
+          <a:avLst>
+            <a:gd name="adj" fmla="val 16670"/>
+          </a:avLst>
+        </a:prstGeom>
+        <a:solidFill>
+          <a:schemeClr val="bg1"/>
+        </a:solidFill>
+        <a:ln w="15875" cap="rnd" cmpd="sng" algn="ctr">
+          <a:solidFill>
+            <a:schemeClr val="tx1"/>
+          </a:solidFill>
+          <a:prstDash val="solid"/>
+        </a:ln>
+        <a:effectLst/>
+      </dsp:spPr>
+      <dsp:style>
+        <a:lnRef idx="2">
+          <a:scrgbClr r="0" g="0" b="0"/>
+        </a:lnRef>
+        <a:fillRef idx="1">
+          <a:scrgbClr r="0" g="0" b="0"/>
+        </a:fillRef>
+        <a:effectRef idx="0">
+          <a:scrgbClr r="0" g="0" b="0"/>
+        </a:effectRef>
+        <a:fontRef idx="minor">
+          <a:schemeClr val="lt1"/>
+        </a:fontRef>
+      </dsp:style>
+      <dsp:txBody>
+        <a:bodyPr spcFirstLastPara="0" vert="horz" wrap="square" lIns="34290" tIns="34290" rIns="34290" bIns="34290" numCol="1" spcCol="1270" anchor="ctr" anchorCtr="0">
+          <a:noAutofit/>
+        </a:bodyPr>
+        <a:lstStyle/>
+        <a:p>
+          <a:pPr lvl="0" algn="ctr" defTabSz="400050">
+            <a:lnSpc>
+              <a:spcPct val="90000"/>
+            </a:lnSpc>
+            <a:spcBef>
+              <a:spcPct val="0"/>
+            </a:spcBef>
+            <a:spcAft>
+              <a:spcPct val="35000"/>
+            </a:spcAft>
+          </a:pPr>
+          <a:r>
+            <a:rPr lang="en-US" sz="900" kern="1200">
+              <a:solidFill>
+                <a:schemeClr val="tx1"/>
+              </a:solidFill>
+            </a:rPr>
+            <a:t>Testing</a:t>
+          </a:r>
+        </a:p>
+      </dsp:txBody>
+      <dsp:txXfrm>
+        <a:off x="5144396" y="2724665"/>
+        <a:ext cx="1296733" cy="535956"/>
+      </dsp:txXfrm>
+    </dsp:sp>
+    <dsp:sp modelId="{9D5A41B0-1F5A-476E-AD64-A7EC83938208}">
+      <dsp:nvSpPr>
+        <dsp:cNvPr id="0" name=""/>
+        <dsp:cNvSpPr/>
+      </dsp:nvSpPr>
+      <dsp:spPr>
+        <a:xfrm>
+          <a:off x="6217037" y="2752312"/>
+          <a:ext cx="617153" cy="480062"/>
+        </a:xfrm>
+        <a:prstGeom prst="rect">
+          <a:avLst/>
+        </a:prstGeom>
+        <a:noFill/>
+        <a:ln>
+          <a:noFill/>
+        </a:ln>
+        <a:effectLst/>
+      </dsp:spPr>
+      <dsp:style>
+        <a:lnRef idx="0">
+          <a:scrgbClr r="0" g="0" b="0"/>
+        </a:lnRef>
+        <a:fillRef idx="0">
+          <a:scrgbClr r="0" g="0" b="0"/>
+        </a:fillRef>
+        <a:effectRef idx="0">
+          <a:scrgbClr r="0" g="0" b="0"/>
+        </a:effectRef>
+        <a:fontRef idx="minor"/>
+      </dsp:style>
+    </dsp:sp>
+    <dsp:sp modelId="{EC49BFF1-EB50-4E64-B178-9BE83BF47B78}">
+      <dsp:nvSpPr>
+        <dsp:cNvPr id="0" name=""/>
+        <dsp:cNvSpPr/>
+      </dsp:nvSpPr>
+      <dsp:spPr>
+        <a:xfrm>
+          <a:off x="6022448" y="3362874"/>
+          <a:ext cx="1405765" cy="593956"/>
+        </a:xfrm>
+        <a:prstGeom prst="roundRect">
+          <a:avLst>
+            <a:gd name="adj" fmla="val 16670"/>
+          </a:avLst>
+        </a:prstGeom>
+        <a:solidFill>
+          <a:schemeClr val="bg1"/>
+        </a:solidFill>
+        <a:ln w="15875" cap="rnd" cmpd="sng" algn="ctr">
+          <a:solidFill>
+            <a:schemeClr val="tx1"/>
+          </a:solidFill>
+          <a:prstDash val="solid"/>
+        </a:ln>
+        <a:effectLst/>
+      </dsp:spPr>
+      <dsp:style>
+        <a:lnRef idx="2">
+          <a:scrgbClr r="0" g="0" b="0"/>
+        </a:lnRef>
+        <a:fillRef idx="1">
+          <a:scrgbClr r="0" g="0" b="0"/>
+        </a:fillRef>
+        <a:effectRef idx="0">
+          <a:scrgbClr r="0" g="0" b="0"/>
+        </a:effectRef>
+        <a:fontRef idx="minor">
+          <a:schemeClr val="lt1"/>
+        </a:fontRef>
+      </dsp:style>
+      <dsp:txBody>
+        <a:bodyPr spcFirstLastPara="0" vert="horz" wrap="square" lIns="34290" tIns="34290" rIns="34290" bIns="34290" numCol="1" spcCol="1270" anchor="ctr" anchorCtr="0">
+          <a:noAutofit/>
+        </a:bodyPr>
+        <a:lstStyle/>
+        <a:p>
+          <a:pPr lvl="0" algn="ctr" defTabSz="400050">
+            <a:lnSpc>
+              <a:spcPct val="90000"/>
+            </a:lnSpc>
+            <a:spcBef>
+              <a:spcPct val="0"/>
+            </a:spcBef>
+            <a:spcAft>
+              <a:spcPct val="35000"/>
+            </a:spcAft>
+          </a:pPr>
+          <a:r>
+            <a:rPr lang="en-US" sz="900" kern="1200">
+              <a:solidFill>
+                <a:schemeClr val="tx1"/>
+              </a:solidFill>
+            </a:rPr>
+            <a:t>Maintenance</a:t>
+          </a:r>
+        </a:p>
+      </dsp:txBody>
+      <dsp:txXfrm>
+        <a:off x="6051448" y="3391874"/>
+        <a:ext cx="1347765" cy="535956"/>
+      </dsp:txXfrm>
+    </dsp:sp>
   </dsp:spTree>
 </dsp:drawing>
 </file>
@@ -11045,6 +11899,66 @@
           <a:chExt cx="0" cy="0"/>
         </a:xfrm>
       </p:grpSpPr>
+      <p:pic>
+        <p:nvPicPr>
+          <p:cNvPr id="2" name="Picture 1"/>
+          <p:cNvPicPr>
+            <a:picLocks noChangeAspect="1"/>
+          </p:cNvPicPr>
+          <p:nvPr/>
+        </p:nvPicPr>
+        <p:blipFill>
+          <a:blip r:embed="rId2">
+            <a:extLst>
+              <a:ext uri="{28A0092B-C50C-407E-A947-70E740481C1C}">
+                <a14:useLocalDpi xmlns:a14="http://schemas.microsoft.com/office/drawing/2010/main" val="0"/>
+              </a:ext>
+            </a:extLst>
+          </a:blip>
+          <a:stretch>
+            <a:fillRect/>
+          </a:stretch>
+        </p:blipFill>
+        <p:spPr>
+          <a:xfrm>
+            <a:off x="1302026" y="1104917"/>
+            <a:ext cx="10058400" cy="5655088"/>
+          </a:xfrm>
+          <a:prstGeom prst="rect">
+            <a:avLst/>
+          </a:prstGeom>
+        </p:spPr>
+      </p:pic>
+    </p:spTree>
+    <p:extLst>
+      <p:ext uri="{BB962C8B-B14F-4D97-AF65-F5344CB8AC3E}">
+        <p14:creationId xmlns:p14="http://schemas.microsoft.com/office/powerpoint/2010/main" val="1786272515"/>
+      </p:ext>
+    </p:extLst>
+  </p:cSld>
+  <p:clrMapOvr>
+    <a:masterClrMapping/>
+  </p:clrMapOvr>
+</p:sld>
+</file>
+
+<file path=ppt/slides/slide9.xml><?xml version="1.0" encoding="utf-8"?>
+<p:sld xmlns:a="http://schemas.openxmlformats.org/drawingml/2006/main" xmlns:r="http://schemas.openxmlformats.org/officeDocument/2006/relationships" xmlns:p="http://schemas.openxmlformats.org/presentationml/2006/main">
+  <p:cSld>
+    <p:spTree>
+      <p:nvGrpSpPr>
+        <p:cNvPr id="1" name=""/>
+        <p:cNvGrpSpPr/>
+        <p:nvPr/>
+      </p:nvGrpSpPr>
+      <p:grpSpPr>
+        <a:xfrm>
+          <a:off x="0" y="0"/>
+          <a:ext cx="0" cy="0"/>
+          <a:chOff x="0" y="0"/>
+          <a:chExt cx="0" cy="0"/>
+        </a:xfrm>
+      </p:grpSpPr>
       <p:sp>
         <p:nvSpPr>
           <p:cNvPr id="2" name="Title 1"/>

</xml_diff>